<commit_message>
tried to clean up the code a bit, though still needs some work. Only produces/outputs a single error number
</commit_message>
<xml_diff>
--- a/analysis/AlphaNeurons.pptx
+++ b/analysis/AlphaNeurons.pptx
@@ -297,7 +297,7 @@
           <a:p>
             <a:fld id="{45D4BEBE-A642-E741-8CA1-82B58E17E8AB}" type="datetimeFigureOut">
               <a:rPr lang="en-US" smtClean="0"/>
-              <a:t>3/16/15</a:t>
+              <a:t>3/19/15</a:t>
             </a:fld>
             <a:endParaRPr lang="en-US"/>
           </a:p>
@@ -467,7 +467,7 @@
           <a:p>
             <a:fld id="{45D4BEBE-A642-E741-8CA1-82B58E17E8AB}" type="datetimeFigureOut">
               <a:rPr lang="en-US" smtClean="0"/>
-              <a:t>3/16/15</a:t>
+              <a:t>3/19/15</a:t>
             </a:fld>
             <a:endParaRPr lang="en-US"/>
           </a:p>
@@ -647,7 +647,7 @@
           <a:p>
             <a:fld id="{45D4BEBE-A642-E741-8CA1-82B58E17E8AB}" type="datetimeFigureOut">
               <a:rPr lang="en-US" smtClean="0"/>
-              <a:t>3/16/15</a:t>
+              <a:t>3/19/15</a:t>
             </a:fld>
             <a:endParaRPr lang="en-US"/>
           </a:p>
@@ -817,7 +817,7 @@
           <a:p>
             <a:fld id="{45D4BEBE-A642-E741-8CA1-82B58E17E8AB}" type="datetimeFigureOut">
               <a:rPr lang="en-US" smtClean="0"/>
-              <a:t>3/16/15</a:t>
+              <a:t>3/19/15</a:t>
             </a:fld>
             <a:endParaRPr lang="en-US"/>
           </a:p>
@@ -1063,7 +1063,7 @@
           <a:p>
             <a:fld id="{45D4BEBE-A642-E741-8CA1-82B58E17E8AB}" type="datetimeFigureOut">
               <a:rPr lang="en-US" smtClean="0"/>
-              <a:t>3/16/15</a:t>
+              <a:t>3/19/15</a:t>
             </a:fld>
             <a:endParaRPr lang="en-US"/>
           </a:p>
@@ -1351,7 +1351,7 @@
           <a:p>
             <a:fld id="{45D4BEBE-A642-E741-8CA1-82B58E17E8AB}" type="datetimeFigureOut">
               <a:rPr lang="en-US" smtClean="0"/>
-              <a:t>3/16/15</a:t>
+              <a:t>3/19/15</a:t>
             </a:fld>
             <a:endParaRPr lang="en-US"/>
           </a:p>
@@ -1773,7 +1773,7 @@
           <a:p>
             <a:fld id="{45D4BEBE-A642-E741-8CA1-82B58E17E8AB}" type="datetimeFigureOut">
               <a:rPr lang="en-US" smtClean="0"/>
-              <a:t>3/16/15</a:t>
+              <a:t>3/19/15</a:t>
             </a:fld>
             <a:endParaRPr lang="en-US"/>
           </a:p>
@@ -1891,7 +1891,7 @@
           <a:p>
             <a:fld id="{45D4BEBE-A642-E741-8CA1-82B58E17E8AB}" type="datetimeFigureOut">
               <a:rPr lang="en-US" smtClean="0"/>
-              <a:t>3/16/15</a:t>
+              <a:t>3/19/15</a:t>
             </a:fld>
             <a:endParaRPr lang="en-US"/>
           </a:p>
@@ -1986,7 +1986,7 @@
           <a:p>
             <a:fld id="{45D4BEBE-A642-E741-8CA1-82B58E17E8AB}" type="datetimeFigureOut">
               <a:rPr lang="en-US" smtClean="0"/>
-              <a:t>3/16/15</a:t>
+              <a:t>3/19/15</a:t>
             </a:fld>
             <a:endParaRPr lang="en-US"/>
           </a:p>
@@ -2263,7 +2263,7 @@
           <a:p>
             <a:fld id="{45D4BEBE-A642-E741-8CA1-82B58E17E8AB}" type="datetimeFigureOut">
               <a:rPr lang="en-US" smtClean="0"/>
-              <a:t>3/16/15</a:t>
+              <a:t>3/19/15</a:t>
             </a:fld>
             <a:endParaRPr lang="en-US"/>
           </a:p>
@@ -2516,7 +2516,7 @@
           <a:p>
             <a:fld id="{45D4BEBE-A642-E741-8CA1-82B58E17E8AB}" type="datetimeFigureOut">
               <a:rPr lang="en-US" smtClean="0"/>
-              <a:t>3/16/15</a:t>
+              <a:t>3/19/15</a:t>
             </a:fld>
             <a:endParaRPr lang="en-US"/>
           </a:p>
@@ -2729,7 +2729,7 @@
           <a:p>
             <a:fld id="{45D4BEBE-A642-E741-8CA1-82B58E17E8AB}" type="datetimeFigureOut">
               <a:rPr lang="en-US" smtClean="0"/>
-              <a:t>3/16/15</a:t>
+              <a:t>3/19/15</a:t>
             </a:fld>
             <a:endParaRPr lang="en-US"/>
           </a:p>
@@ -3119,6 +3119,14 @@
           <a:bodyPr/>
           <a:lstStyle/>
           <a:p>
+            <a:r>
+              <a:rPr lang="en-US" dirty="0" smtClean="0"/>
+              <a:t>Alphas, </a:t>
+            </a:r>
+            <a:r>
+              <a:rPr lang="en-US" smtClean="0"/>
+              <a:t>all Neurons</a:t>
+            </a:r>
             <a:endParaRPr lang="en-US"/>
           </a:p>
         </p:txBody>

</xml_diff>